<commit_message>
Reviewed all Tutorial configuration files
</commit_message>
<xml_diff>
--- a/Assets/StreamingAssets/2D_Objects/Test/~Test.pptx
+++ b/Assets/StreamingAssets/2D_Objects/Test/~Test.pptx
@@ -91,6 +91,7 @@
     <p:sldId id="431" r:id="rId85"/>
     <p:sldId id="432" r:id="rId86"/>
     <p:sldId id="433" r:id="rId87"/>
+    <p:sldId id="434" r:id="rId88"/>
   </p:sldIdLst>
   <p:sldSz cx="12192000" cy="6858000"/>
   <p:notesSz cx="6858000" cy="9144000"/>
@@ -344,7 +345,7 @@
           <a:p>
             <a:fld id="{43D9F887-C526-42E2-BE1C-7F1C55940A26}" type="datetimeFigureOut">
               <a:rPr lang="en-US" smtClean="0"/>
-              <a:t>7/27/2020</a:t>
+              <a:t>7/29/2020</a:t>
             </a:fld>
             <a:endParaRPr lang="en-US"/>
           </a:p>
@@ -542,7 +543,7 @@
           <a:p>
             <a:fld id="{43D9F887-C526-42E2-BE1C-7F1C55940A26}" type="datetimeFigureOut">
               <a:rPr lang="en-US" smtClean="0"/>
-              <a:t>7/27/2020</a:t>
+              <a:t>7/29/2020</a:t>
             </a:fld>
             <a:endParaRPr lang="en-US"/>
           </a:p>
@@ -750,7 +751,7 @@
           <a:p>
             <a:fld id="{43D9F887-C526-42E2-BE1C-7F1C55940A26}" type="datetimeFigureOut">
               <a:rPr lang="en-US" smtClean="0"/>
-              <a:t>7/27/2020</a:t>
+              <a:t>7/29/2020</a:t>
             </a:fld>
             <a:endParaRPr lang="en-US"/>
           </a:p>
@@ -948,7 +949,7 @@
           <a:p>
             <a:fld id="{43D9F887-C526-42E2-BE1C-7F1C55940A26}" type="datetimeFigureOut">
               <a:rPr lang="en-US" smtClean="0"/>
-              <a:t>7/27/2020</a:t>
+              <a:t>7/29/2020</a:t>
             </a:fld>
             <a:endParaRPr lang="en-US"/>
           </a:p>
@@ -1223,7 +1224,7 @@
           <a:p>
             <a:fld id="{43D9F887-C526-42E2-BE1C-7F1C55940A26}" type="datetimeFigureOut">
               <a:rPr lang="en-US" smtClean="0"/>
-              <a:t>7/27/2020</a:t>
+              <a:t>7/29/2020</a:t>
             </a:fld>
             <a:endParaRPr lang="en-US"/>
           </a:p>
@@ -1488,7 +1489,7 @@
           <a:p>
             <a:fld id="{43D9F887-C526-42E2-BE1C-7F1C55940A26}" type="datetimeFigureOut">
               <a:rPr lang="en-US" smtClean="0"/>
-              <a:t>7/27/2020</a:t>
+              <a:t>7/29/2020</a:t>
             </a:fld>
             <a:endParaRPr lang="en-US"/>
           </a:p>
@@ -1900,7 +1901,7 @@
           <a:p>
             <a:fld id="{43D9F887-C526-42E2-BE1C-7F1C55940A26}" type="datetimeFigureOut">
               <a:rPr lang="en-US" smtClean="0"/>
-              <a:t>7/27/2020</a:t>
+              <a:t>7/29/2020</a:t>
             </a:fld>
             <a:endParaRPr lang="en-US"/>
           </a:p>
@@ -2041,7 +2042,7 @@
           <a:p>
             <a:fld id="{43D9F887-C526-42E2-BE1C-7F1C55940A26}" type="datetimeFigureOut">
               <a:rPr lang="en-US" smtClean="0"/>
-              <a:t>7/27/2020</a:t>
+              <a:t>7/29/2020</a:t>
             </a:fld>
             <a:endParaRPr lang="en-US"/>
           </a:p>
@@ -2154,7 +2155,7 @@
           <a:p>
             <a:fld id="{43D9F887-C526-42E2-BE1C-7F1C55940A26}" type="datetimeFigureOut">
               <a:rPr lang="en-US" smtClean="0"/>
-              <a:t>7/27/2020</a:t>
+              <a:t>7/29/2020</a:t>
             </a:fld>
             <a:endParaRPr lang="en-US"/>
           </a:p>
@@ -2465,7 +2466,7 @@
           <a:p>
             <a:fld id="{43D9F887-C526-42E2-BE1C-7F1C55940A26}" type="datetimeFigureOut">
               <a:rPr lang="en-US" smtClean="0"/>
-              <a:t>7/27/2020</a:t>
+              <a:t>7/29/2020</a:t>
             </a:fld>
             <a:endParaRPr lang="en-US"/>
           </a:p>
@@ -2753,7 +2754,7 @@
           <a:p>
             <a:fld id="{43D9F887-C526-42E2-BE1C-7F1C55940A26}" type="datetimeFigureOut">
               <a:rPr lang="en-US" smtClean="0"/>
-              <a:t>7/27/2020</a:t>
+              <a:t>7/29/2020</a:t>
             </a:fld>
             <a:endParaRPr lang="en-US"/>
           </a:p>
@@ -2994,7 +2995,7 @@
           <a:p>
             <a:fld id="{43D9F887-C526-42E2-BE1C-7F1C55940A26}" type="datetimeFigureOut">
               <a:rPr lang="en-US" smtClean="0"/>
-              <a:t>7/27/2020</a:t>
+              <a:t>7/29/2020</a:t>
             </a:fld>
             <a:endParaRPr lang="en-US"/>
           </a:p>
@@ -14991,6 +14992,116 @@
 </p:sld>
 </file>
 
+<file path=ppt/slides/slide87.xml><?xml version="1.0" encoding="utf-8"?>
+<p:sld xmlns:a="http://schemas.openxmlformats.org/drawingml/2006/main" xmlns:r="http://schemas.openxmlformats.org/officeDocument/2006/relationships" xmlns:p="http://schemas.openxmlformats.org/presentationml/2006/main">
+  <p:cSld>
+    <p:spTree>
+      <p:nvGrpSpPr>
+        <p:cNvPr id="1" name=""/>
+        <p:cNvGrpSpPr/>
+        <p:nvPr/>
+      </p:nvGrpSpPr>
+      <p:grpSpPr>
+        <a:xfrm>
+          <a:off x="0" y="0"/>
+          <a:ext cx="0" cy="0"/>
+          <a:chOff x="0" y="0"/>
+          <a:chExt cx="0" cy="0"/>
+        </a:xfrm>
+      </p:grpSpPr>
+      <p:sp>
+        <p:nvSpPr>
+          <p:cNvPr id="2" name="Title 1">
+            <a:extLst>
+              <a:ext uri="{FF2B5EF4-FFF2-40B4-BE49-F238E27FC236}">
+                <a16:creationId xmlns:a16="http://schemas.microsoft.com/office/drawing/2014/main" id="{CCBE719D-1725-43E8-8721-DB4618B5955A}"/>
+              </a:ext>
+            </a:extLst>
+          </p:cNvPr>
+          <p:cNvSpPr>
+            <a:spLocks noGrp="1"/>
+          </p:cNvSpPr>
+          <p:nvPr>
+            <p:ph type="title"/>
+          </p:nvPr>
+        </p:nvSpPr>
+        <p:spPr>
+          <a:xfrm>
+            <a:off x="838200" y="1596356"/>
+            <a:ext cx="10515600" cy="1325563"/>
+          </a:xfrm>
+        </p:spPr>
+        <p:txBody>
+          <a:bodyPr/>
+          <a:lstStyle/>
+          <a:p>
+            <a:pPr algn="ctr"/>
+            <a:r>
+              <a:rPr lang="en-US" b="1" dirty="0">
+                <a:latin typeface="+mn-lt"/>
+              </a:rPr>
+              <a:t>URL Test</a:t>
+            </a:r>
+          </a:p>
+        </p:txBody>
+      </p:sp>
+      <p:sp>
+        <p:nvSpPr>
+          <p:cNvPr id="3" name="Content Placeholder 2">
+            <a:extLst>
+              <a:ext uri="{FF2B5EF4-FFF2-40B4-BE49-F238E27FC236}">
+                <a16:creationId xmlns:a16="http://schemas.microsoft.com/office/drawing/2014/main" id="{B165FD55-32E6-41E9-8D1B-A30EC55F2231}"/>
+              </a:ext>
+            </a:extLst>
+          </p:cNvPr>
+          <p:cNvSpPr>
+            <a:spLocks noGrp="1"/>
+          </p:cNvSpPr>
+          <p:nvPr>
+            <p:ph idx="1"/>
+          </p:nvPr>
+        </p:nvSpPr>
+        <p:spPr>
+          <a:xfrm>
+            <a:off x="838200" y="3581399"/>
+            <a:ext cx="10515600" cy="2595563"/>
+          </a:xfrm>
+        </p:spPr>
+        <p:txBody>
+          <a:bodyPr/>
+          <a:lstStyle/>
+          <a:p>
+            <a:pPr marL="0" indent="0" algn="ctr">
+              <a:buNone/>
+            </a:pPr>
+            <a:r>
+              <a:rPr lang="en-US" dirty="0"/>
+              <a:t>Press the </a:t>
+            </a:r>
+            <a:r>
+              <a:rPr lang="en-US" b="1" dirty="0"/>
+              <a:t>End Experiment </a:t>
+            </a:r>
+            <a:r>
+              <a:rPr lang="en-US" dirty="0"/>
+              <a:t>button below to test if your URL is working </a:t>
+            </a:r>
+          </a:p>
+        </p:txBody>
+      </p:sp>
+    </p:spTree>
+    <p:extLst>
+      <p:ext uri="{BB962C8B-B14F-4D97-AF65-F5344CB8AC3E}">
+        <p14:creationId xmlns:p14="http://schemas.microsoft.com/office/powerpoint/2010/main" val="3832414168"/>
+      </p:ext>
+    </p:extLst>
+  </p:cSld>
+  <p:clrMapOvr>
+    <a:masterClrMapping/>
+  </p:clrMapOvr>
+</p:sld>
+</file>
+
 <file path=ppt/slides/slide9.xml><?xml version="1.0" encoding="utf-8"?>
 <p:sld xmlns:a="http://schemas.openxmlformats.org/drawingml/2006/main" xmlns:r="http://schemas.openxmlformats.org/officeDocument/2006/relationships" xmlns:p="http://schemas.openxmlformats.org/presentationml/2006/main">
   <p:cSld>

</xml_diff>